<commit_message>
added pdf for ppt
</commit_message>
<xml_diff>
--- a/documents/Credit card default.pptx
+++ b/documents/Credit card default.pptx
@@ -332,7 +332,7 @@
             <a:fld id="{1D8BD707-D9CF-40AE-B4C6-C98DA3205C09}" type="datetimeFigureOut">
               <a:rPr lang="en-US" smtClean="0"/>
               <a:pPr/>
-              <a:t>7/24/2023</a:t>
+              <a:t>8/3/2023</a:t>
             </a:fld>
             <a:endParaRPr lang="en-US"/>
           </a:p>
@@ -497,7 +497,7 @@
             <a:fld id="{1D8BD707-D9CF-40AE-B4C6-C98DA3205C09}" type="datetimeFigureOut">
               <a:rPr lang="en-US" smtClean="0"/>
               <a:pPr/>
-              <a:t>7/24/2023</a:t>
+              <a:t>8/3/2023</a:t>
             </a:fld>
             <a:endParaRPr lang="en-US"/>
           </a:p>
@@ -672,7 +672,7 @@
             <a:fld id="{1D8BD707-D9CF-40AE-B4C6-C98DA3205C09}" type="datetimeFigureOut">
               <a:rPr lang="en-US" smtClean="0"/>
               <a:pPr/>
-              <a:t>7/24/2023</a:t>
+              <a:t>8/3/2023</a:t>
             </a:fld>
             <a:endParaRPr lang="en-US"/>
           </a:p>
@@ -837,7 +837,7 @@
             <a:fld id="{1D8BD707-D9CF-40AE-B4C6-C98DA3205C09}" type="datetimeFigureOut">
               <a:rPr lang="en-US" smtClean="0"/>
               <a:pPr/>
-              <a:t>7/24/2023</a:t>
+              <a:t>8/3/2023</a:t>
             </a:fld>
             <a:endParaRPr lang="en-US"/>
           </a:p>
@@ -1079,7 +1079,7 @@
             <a:fld id="{1D8BD707-D9CF-40AE-B4C6-C98DA3205C09}" type="datetimeFigureOut">
               <a:rPr lang="en-US" smtClean="0"/>
               <a:pPr/>
-              <a:t>7/24/2023</a:t>
+              <a:t>8/3/2023</a:t>
             </a:fld>
             <a:endParaRPr lang="en-US"/>
           </a:p>
@@ -1361,7 +1361,7 @@
             <a:fld id="{1D8BD707-D9CF-40AE-B4C6-C98DA3205C09}" type="datetimeFigureOut">
               <a:rPr lang="en-US" smtClean="0"/>
               <a:pPr/>
-              <a:t>7/24/2023</a:t>
+              <a:t>8/3/2023</a:t>
             </a:fld>
             <a:endParaRPr lang="en-US"/>
           </a:p>
@@ -1777,7 +1777,7 @@
             <a:fld id="{1D8BD707-D9CF-40AE-B4C6-C98DA3205C09}" type="datetimeFigureOut">
               <a:rPr lang="en-US" smtClean="0"/>
               <a:pPr/>
-              <a:t>7/24/2023</a:t>
+              <a:t>8/3/2023</a:t>
             </a:fld>
             <a:endParaRPr lang="en-US"/>
           </a:p>
@@ -1891,7 +1891,7 @@
             <a:fld id="{1D8BD707-D9CF-40AE-B4C6-C98DA3205C09}" type="datetimeFigureOut">
               <a:rPr lang="en-US" smtClean="0"/>
               <a:pPr/>
-              <a:t>7/24/2023</a:t>
+              <a:t>8/3/2023</a:t>
             </a:fld>
             <a:endParaRPr lang="en-US"/>
           </a:p>
@@ -1983,7 +1983,7 @@
             <a:fld id="{1D8BD707-D9CF-40AE-B4C6-C98DA3205C09}" type="datetimeFigureOut">
               <a:rPr lang="en-US" smtClean="0"/>
               <a:pPr/>
-              <a:t>7/24/2023</a:t>
+              <a:t>8/3/2023</a:t>
             </a:fld>
             <a:endParaRPr lang="en-US"/>
           </a:p>
@@ -2255,7 +2255,7 @@
             <a:fld id="{1D8BD707-D9CF-40AE-B4C6-C98DA3205C09}" type="datetimeFigureOut">
               <a:rPr lang="en-US" smtClean="0"/>
               <a:pPr/>
-              <a:t>7/24/2023</a:t>
+              <a:t>8/3/2023</a:t>
             </a:fld>
             <a:endParaRPr lang="en-US"/>
           </a:p>
@@ -2504,7 +2504,7 @@
             <a:fld id="{1D8BD707-D9CF-40AE-B4C6-C98DA3205C09}" type="datetimeFigureOut">
               <a:rPr lang="en-US" smtClean="0"/>
               <a:pPr/>
-              <a:t>7/24/2023</a:t>
+              <a:t>8/3/2023</a:t>
             </a:fld>
             <a:endParaRPr lang="en-US"/>
           </a:p>
@@ -2712,7 +2712,7 @@
             <a:fld id="{1D8BD707-D9CF-40AE-B4C6-C98DA3205C09}" type="datetimeFigureOut">
               <a:rPr lang="en-US" smtClean="0"/>
               <a:pPr/>
-              <a:t>7/24/2023</a:t>
+              <a:t>8/3/2023</a:t>
             </a:fld>
             <a:endParaRPr lang="en-US"/>
           </a:p>
@@ -5757,7 +5757,7 @@
         <p:spPr>
           <a:xfrm>
             <a:off x="6276841" y="6578557"/>
-            <a:ext cx="2149547" cy="349250"/>
+            <a:ext cx="2149547" cy="329642"/>
           </a:xfrm>
           <a:prstGeom prst="rect">
             <a:avLst/>
@@ -5775,51 +5775,13 @@
               </a:lnSpc>
             </a:pPr>
             <a:r>
-              <a:rPr lang="en-US" sz="2000">
+              <a:rPr lang="en-US" sz="2000" dirty="0">
                 <a:solidFill>
                   <a:srgbClr val="504C44"/>
                 </a:solidFill>
                 <a:latin typeface="Inter Bold"/>
               </a:rPr>
-              <a:t>Phone </a:t>
-            </a:r>
-          </a:p>
-        </p:txBody>
-      </p:sp>
-      <p:sp>
-        <p:nvSpPr>
-          <p:cNvPr id="12" name="TextBox 12"/>
-          <p:cNvSpPr txBox="1"/>
-          <p:nvPr/>
-        </p:nvSpPr>
-        <p:spPr>
-          <a:xfrm>
-            <a:off x="8426388" y="6578557"/>
-            <a:ext cx="5362304" cy="349250"/>
-          </a:xfrm>
-          <a:prstGeom prst="rect">
-            <a:avLst/>
-          </a:prstGeom>
-        </p:spPr>
-        <p:txBody>
-          <a:bodyPr lIns="0" tIns="0" rIns="0" bIns="0" rtlCol="0" anchor="t">
-            <a:spAutoFit/>
-          </a:bodyPr>
-          <a:lstStyle/>
-          <a:p>
-            <a:pPr>
-              <a:lnSpc>
-                <a:spcPts val="2800"/>
-              </a:lnSpc>
-            </a:pPr>
-            <a:r>
-              <a:rPr lang="en-US" sz="2000">
-                <a:solidFill>
-                  <a:srgbClr val="504C44"/>
-                </a:solidFill>
-                <a:latin typeface="Inter"/>
-              </a:rPr>
-              <a:t>+91 99883 73441</a:t>
+              <a:t> </a:t>
             </a:r>
           </a:p>
         </p:txBody>

</xml_diff>